<commit_message>
Step 2: Mallet Topic Modeling with topic sets
Step 2: Mallet Topic Modeling with iterative topic sets
</commit_message>
<xml_diff>
--- a/FakeNewsExecutionInstructions.pptx
+++ b/FakeNewsExecutionInstructions.pptx
@@ -6,6 +6,7 @@
   </p:sldMasterIdLst>
   <p:sldIdLst>
     <p:sldId id="256" r:id="rId2"/>
+    <p:sldId id="257" r:id="rId3"/>
   </p:sldIdLst>
   <p:sldSz cx="9144000" cy="6858000" type="screen4x3"/>
   <p:notesSz cx="6858000" cy="9144000"/>
@@ -104,6 +105,11 @@
       </a:defRPr>
     </a:lvl9pPr>
   </p:defaultTextStyle>
+  <p:extLst>
+    <p:ext uri="{EFAFB233-063F-42B5-8137-9DF3F51BA10A}">
+      <p15:sldGuideLst xmlns:p15="http://schemas.microsoft.com/office/powerpoint/2012/main"/>
+    </p:ext>
+  </p:extLst>
 </p:presentation>
 </file>
 
@@ -2980,7 +2986,7 @@
         </p:nvSpPr>
         <p:spPr>
           <a:xfrm>
-            <a:off x="1647825" y="2972637"/>
+            <a:off x="1647825" y="1321383"/>
             <a:ext cx="1581151" cy="866775"/>
           </a:xfrm>
           <a:prstGeom prst="flowChartOnlineStorage">
@@ -3033,7 +3039,7 @@
         </p:nvSpPr>
         <p:spPr>
           <a:xfrm>
-            <a:off x="3829050" y="2972637"/>
+            <a:off x="3829050" y="1321383"/>
             <a:ext cx="1400175" cy="866775"/>
           </a:xfrm>
           <a:prstGeom prst="flowChartAlternateProcess">
@@ -3093,7 +3099,7 @@
         </p:nvSpPr>
         <p:spPr>
           <a:xfrm>
-            <a:off x="5829301" y="2972637"/>
+            <a:off x="5829301" y="1321383"/>
             <a:ext cx="1581151" cy="866775"/>
           </a:xfrm>
           <a:prstGeom prst="flowChartOnlineStorage">
@@ -3146,7 +3152,7 @@
         </p:nvSpPr>
         <p:spPr>
           <a:xfrm>
-            <a:off x="1647825" y="2153484"/>
+            <a:off x="1647825" y="502230"/>
             <a:ext cx="5848351" cy="677108"/>
           </a:xfrm>
           <a:prstGeom prst="rect">
@@ -3203,7 +3209,7 @@
         </p:nvCxnSpPr>
         <p:spPr>
           <a:xfrm>
-            <a:off x="2965450" y="3406021"/>
+            <a:off x="2965450" y="1754767"/>
             <a:ext cx="863600" cy="0"/>
           </a:xfrm>
           <a:prstGeom prst="straightConnector1">
@@ -3246,7 +3252,7 @@
         </p:nvCxnSpPr>
         <p:spPr>
           <a:xfrm>
-            <a:off x="5229228" y="3406021"/>
+            <a:off x="5229228" y="1754767"/>
             <a:ext cx="600075" cy="0"/>
           </a:xfrm>
           <a:prstGeom prst="straightConnector1">
@@ -3285,7 +3291,7 @@
         </p:nvSpPr>
         <p:spPr>
           <a:xfrm>
-            <a:off x="1647825" y="3981451"/>
+            <a:off x="1647825" y="2330197"/>
             <a:ext cx="5848351" cy="830997"/>
           </a:xfrm>
           <a:prstGeom prst="rect">
@@ -3322,6 +3328,516 @@
     <p:extLst>
       <p:ext uri="{BB962C8B-B14F-4D97-AF65-F5344CB8AC3E}">
         <p14:creationId xmlns:p14="http://schemas.microsoft.com/office/powerpoint/2010/main" val="2071764005"/>
+      </p:ext>
+    </p:extLst>
+  </p:cSld>
+  <p:clrMapOvr>
+    <a:masterClrMapping/>
+  </p:clrMapOvr>
+</p:sld>
+</file>
+
+<file path=ppt/slides/slide2.xml><?xml version="1.0" encoding="utf-8"?>
+<p:sld xmlns:a="http://schemas.openxmlformats.org/drawingml/2006/main" xmlns:r="http://schemas.openxmlformats.org/officeDocument/2006/relationships" xmlns:p="http://schemas.openxmlformats.org/presentationml/2006/main">
+  <p:cSld>
+    <p:spTree>
+      <p:nvGrpSpPr>
+        <p:cNvPr id="1" name=""/>
+        <p:cNvGrpSpPr/>
+        <p:nvPr/>
+      </p:nvGrpSpPr>
+      <p:grpSpPr>
+        <a:xfrm>
+          <a:off x="0" y="0"/>
+          <a:ext cx="0" cy="0"/>
+          <a:chOff x="0" y="0"/>
+          <a:chExt cx="0" cy="0"/>
+        </a:xfrm>
+      </p:grpSpPr>
+      <p:sp>
+        <p:nvSpPr>
+          <p:cNvPr id="4" name="Flowchart: Stored Data 3">
+            <a:extLst>
+              <a:ext uri="{FF2B5EF4-FFF2-40B4-BE49-F238E27FC236}">
+                <a16:creationId xmlns:a16="http://schemas.microsoft.com/office/drawing/2014/main" id="{43B0CD6F-8087-429C-9DEA-967FEAE7D02E}"/>
+              </a:ext>
+            </a:extLst>
+          </p:cNvPr>
+          <p:cNvSpPr/>
+          <p:nvPr/>
+        </p:nvSpPr>
+        <p:spPr>
+          <a:xfrm>
+            <a:off x="1647825" y="1321386"/>
+            <a:ext cx="1581151" cy="866775"/>
+          </a:xfrm>
+          <a:prstGeom prst="flowChartOnlineStorage">
+            <a:avLst/>
+          </a:prstGeom>
+        </p:spPr>
+        <p:style>
+          <a:lnRef idx="1">
+            <a:schemeClr val="accent1"/>
+          </a:lnRef>
+          <a:fillRef idx="2">
+            <a:schemeClr val="accent1"/>
+          </a:fillRef>
+          <a:effectRef idx="1">
+            <a:schemeClr val="accent1"/>
+          </a:effectRef>
+          <a:fontRef idx="minor">
+            <a:schemeClr val="dk1"/>
+          </a:fontRef>
+        </p:style>
+        <p:txBody>
+          <a:bodyPr rot="0" spcFirstLastPara="0" vertOverflow="overflow" horzOverflow="overflow" vert="horz" wrap="square" lIns="0" tIns="45721" rIns="0" bIns="45721" numCol="1" spcCol="0" rtlCol="0" fromWordArt="0" anchor="ctr" anchorCtr="0" forceAA="0" compatLnSpc="1">
+            <a:prstTxWarp prst="textNoShape">
+              <a:avLst/>
+            </a:prstTxWarp>
+            <a:noAutofit/>
+          </a:bodyPr>
+          <a:lstStyle/>
+          <a:p>
+            <a:pPr algn="ctr"/>
+            <a:r>
+              <a:rPr lang="en-US" sz="1200" dirty="0"/>
+              <a:t>File corpus</a:t>
+            </a:r>
+          </a:p>
+          <a:p>
+            <a:pPr algn="ctr"/>
+            <a:r>
+              <a:rPr lang="en-US" sz="1200" dirty="0" err="1"/>
+              <a:t>liar_data_dir</a:t>
+            </a:r>
+            <a:endParaRPr lang="en-US" sz="1200" dirty="0"/>
+          </a:p>
+        </p:txBody>
+      </p:sp>
+      <p:sp>
+        <p:nvSpPr>
+          <p:cNvPr id="5" name="Flowchart: Alternate Process 4">
+            <a:extLst>
+              <a:ext uri="{FF2B5EF4-FFF2-40B4-BE49-F238E27FC236}">
+                <a16:creationId xmlns:a16="http://schemas.microsoft.com/office/drawing/2014/main" id="{797E2542-1966-4B47-9544-D5DA577A1861}"/>
+              </a:ext>
+            </a:extLst>
+          </p:cNvPr>
+          <p:cNvSpPr/>
+          <p:nvPr/>
+        </p:nvSpPr>
+        <p:spPr>
+          <a:xfrm>
+            <a:off x="3829050" y="1321386"/>
+            <a:ext cx="1400175" cy="866775"/>
+          </a:xfrm>
+          <a:prstGeom prst="flowChartAlternateProcess">
+            <a:avLst/>
+          </a:prstGeom>
+        </p:spPr>
+        <p:style>
+          <a:lnRef idx="1">
+            <a:schemeClr val="accent2"/>
+          </a:lnRef>
+          <a:fillRef idx="2">
+            <a:schemeClr val="accent2"/>
+          </a:fillRef>
+          <a:effectRef idx="1">
+            <a:schemeClr val="accent2"/>
+          </a:effectRef>
+          <a:fontRef idx="minor">
+            <a:schemeClr val="dk1"/>
+          </a:fontRef>
+        </p:style>
+        <p:txBody>
+          <a:bodyPr rot="0" spcFirstLastPara="0" vertOverflow="overflow" horzOverflow="overflow" vert="horz" wrap="square" lIns="91440" tIns="45721" rIns="91440" bIns="45721" numCol="1" spcCol="0" rtlCol="0" fromWordArt="0" anchor="ctr" anchorCtr="0" forceAA="0" compatLnSpc="1">
+            <a:prstTxWarp prst="textNoShape">
+              <a:avLst/>
+            </a:prstTxWarp>
+            <a:noAutofit/>
+          </a:bodyPr>
+          <a:lstStyle/>
+          <a:p>
+            <a:pPr algn="ctr"/>
+            <a:r>
+              <a:rPr lang="en-US" sz="1200" dirty="0" err="1"/>
+              <a:t>FNb</a:t>
+            </a:r>
+            <a:endParaRPr lang="en-US" sz="1200" dirty="0"/>
+          </a:p>
+          <a:p>
+            <a:pPr algn="ctr"/>
+            <a:r>
+              <a:rPr lang="en-US" sz="1200" dirty="0"/>
+              <a:t>(dos bat file)</a:t>
+            </a:r>
+          </a:p>
+        </p:txBody>
+      </p:sp>
+      <p:sp>
+        <p:nvSpPr>
+          <p:cNvPr id="6" name="Flowchart: Stored Data 5">
+            <a:extLst>
+              <a:ext uri="{FF2B5EF4-FFF2-40B4-BE49-F238E27FC236}">
+                <a16:creationId xmlns:a16="http://schemas.microsoft.com/office/drawing/2014/main" id="{C668E419-CA4D-4445-8396-3F89E2CAE807}"/>
+              </a:ext>
+            </a:extLst>
+          </p:cNvPr>
+          <p:cNvSpPr/>
+          <p:nvPr/>
+        </p:nvSpPr>
+        <p:spPr>
+          <a:xfrm>
+            <a:off x="5829301" y="1321386"/>
+            <a:ext cx="1581151" cy="866775"/>
+          </a:xfrm>
+          <a:prstGeom prst="flowChartOnlineStorage">
+            <a:avLst/>
+          </a:prstGeom>
+        </p:spPr>
+        <p:style>
+          <a:lnRef idx="1">
+            <a:schemeClr val="accent1"/>
+          </a:lnRef>
+          <a:fillRef idx="2">
+            <a:schemeClr val="accent1"/>
+          </a:fillRef>
+          <a:effectRef idx="1">
+            <a:schemeClr val="accent1"/>
+          </a:effectRef>
+          <a:fontRef idx="minor">
+            <a:schemeClr val="dk1"/>
+          </a:fontRef>
+        </p:style>
+        <p:txBody>
+          <a:bodyPr rot="0" spcFirstLastPara="0" vertOverflow="overflow" horzOverflow="overflow" vert="horz" wrap="square" lIns="0" tIns="45721" rIns="0" bIns="45721" numCol="1" spcCol="0" rtlCol="0" fromWordArt="0" anchor="ctr" anchorCtr="0" forceAA="0" compatLnSpc="1">
+            <a:prstTxWarp prst="textNoShape">
+              <a:avLst/>
+            </a:prstTxWarp>
+            <a:noAutofit/>
+          </a:bodyPr>
+          <a:lstStyle/>
+          <a:p>
+            <a:r>
+              <a:rPr lang="en-US" sz="1200" dirty="0"/>
+              <a:t>Per execution</a:t>
+            </a:r>
+          </a:p>
+          <a:p>
+            <a:pPr marL="171450" indent="-171450">
+              <a:buFontTx/>
+              <a:buChar char="-"/>
+            </a:pPr>
+            <a:r>
+              <a:rPr lang="en-US" sz="1200" dirty="0"/>
+              <a:t>Log file</a:t>
+            </a:r>
+          </a:p>
+          <a:p>
+            <a:pPr marL="171450" indent="-171450">
+              <a:buFontTx/>
+              <a:buChar char="-"/>
+            </a:pPr>
+            <a:r>
+              <a:rPr lang="en-US" sz="1200" dirty="0"/>
+              <a:t>Topic set files</a:t>
+            </a:r>
+          </a:p>
+        </p:txBody>
+      </p:sp>
+      <p:sp>
+        <p:nvSpPr>
+          <p:cNvPr id="7" name="TextBox 6">
+            <a:extLst>
+              <a:ext uri="{FF2B5EF4-FFF2-40B4-BE49-F238E27FC236}">
+                <a16:creationId xmlns:a16="http://schemas.microsoft.com/office/drawing/2014/main" id="{A0B04D06-8E34-46CE-82E4-D49C3EC0EB61}"/>
+              </a:ext>
+            </a:extLst>
+          </p:cNvPr>
+          <p:cNvSpPr txBox="1"/>
+          <p:nvPr/>
+        </p:nvSpPr>
+        <p:spPr>
+          <a:xfrm>
+            <a:off x="1647825" y="502233"/>
+            <a:ext cx="5848351" cy="492443"/>
+          </a:xfrm>
+          <a:prstGeom prst="rect">
+            <a:avLst/>
+          </a:prstGeom>
+          <a:noFill/>
+        </p:spPr>
+        <p:txBody>
+          <a:bodyPr wrap="square" rtlCol="0">
+            <a:spAutoFit/>
+          </a:bodyPr>
+          <a:lstStyle/>
+          <a:p>
+            <a:r>
+              <a:rPr lang="en-US" sz="1400" u="sng" dirty="0"/>
+              <a:t>Step 2: Topic Modeling using Mallet</a:t>
+            </a:r>
+            <a:r>
+              <a:rPr lang="en-US" sz="1200" dirty="0"/>
+              <a:t>- Using the file based corpus from Step 1, run the </a:t>
+            </a:r>
+            <a:r>
+              <a:rPr lang="en-US" sz="1200" dirty="0" err="1"/>
+              <a:t>FNb</a:t>
+            </a:r>
+            <a:r>
+              <a:rPr lang="en-US" sz="1200" dirty="0"/>
+              <a:t> script and produce multiple Mallet outputs</a:t>
+            </a:r>
+          </a:p>
+        </p:txBody>
+      </p:sp>
+      <p:cxnSp>
+        <p:nvCxnSpPr>
+          <p:cNvPr id="9" name="Straight Arrow Connector 8">
+            <a:extLst>
+              <a:ext uri="{FF2B5EF4-FFF2-40B4-BE49-F238E27FC236}">
+                <a16:creationId xmlns:a16="http://schemas.microsoft.com/office/drawing/2014/main" id="{D697D031-988D-4DA4-9C29-7D41D967F1FE}"/>
+              </a:ext>
+            </a:extLst>
+          </p:cNvPr>
+          <p:cNvCxnSpPr>
+            <a:cxnSpLocks/>
+            <a:stCxn id="4" idx="3"/>
+            <a:endCxn id="5" idx="1"/>
+          </p:cNvCxnSpPr>
+          <p:nvPr/>
+        </p:nvCxnSpPr>
+        <p:spPr>
+          <a:xfrm>
+            <a:off x="2965450" y="1754770"/>
+            <a:ext cx="863600" cy="0"/>
+          </a:xfrm>
+          <a:prstGeom prst="straightConnector1">
+            <a:avLst/>
+          </a:prstGeom>
+          <a:ln>
+            <a:tailEnd type="triangle"/>
+          </a:ln>
+        </p:spPr>
+        <p:style>
+          <a:lnRef idx="2">
+            <a:schemeClr val="accent1"/>
+          </a:lnRef>
+          <a:fillRef idx="0">
+            <a:schemeClr val="accent1"/>
+          </a:fillRef>
+          <a:effectRef idx="1">
+            <a:schemeClr val="accent1"/>
+          </a:effectRef>
+          <a:fontRef idx="minor">
+            <a:schemeClr val="tx1"/>
+          </a:fontRef>
+        </p:style>
+      </p:cxnSp>
+      <p:cxnSp>
+        <p:nvCxnSpPr>
+          <p:cNvPr id="10" name="Straight Arrow Connector 9">
+            <a:extLst>
+              <a:ext uri="{FF2B5EF4-FFF2-40B4-BE49-F238E27FC236}">
+                <a16:creationId xmlns:a16="http://schemas.microsoft.com/office/drawing/2014/main" id="{ABC6B728-F278-47AC-ACCA-2E8720493BC4}"/>
+              </a:ext>
+            </a:extLst>
+          </p:cNvPr>
+          <p:cNvCxnSpPr>
+            <a:cxnSpLocks/>
+            <a:stCxn id="5" idx="3"/>
+            <a:endCxn id="6" idx="1"/>
+          </p:cNvCxnSpPr>
+          <p:nvPr/>
+        </p:nvCxnSpPr>
+        <p:spPr>
+          <a:xfrm>
+            <a:off x="5229228" y="1754770"/>
+            <a:ext cx="600075" cy="0"/>
+          </a:xfrm>
+          <a:prstGeom prst="straightConnector1">
+            <a:avLst/>
+          </a:prstGeom>
+          <a:ln>
+            <a:tailEnd type="triangle"/>
+          </a:ln>
+        </p:spPr>
+        <p:style>
+          <a:lnRef idx="2">
+            <a:schemeClr val="accent1"/>
+          </a:lnRef>
+          <a:fillRef idx="0">
+            <a:schemeClr val="accent1"/>
+          </a:fillRef>
+          <a:effectRef idx="1">
+            <a:schemeClr val="accent1"/>
+          </a:effectRef>
+          <a:fontRef idx="minor">
+            <a:schemeClr val="tx1"/>
+          </a:fontRef>
+        </p:style>
+      </p:cxnSp>
+      <p:sp>
+        <p:nvSpPr>
+          <p:cNvPr id="18" name="TextBox 17">
+            <a:extLst>
+              <a:ext uri="{FF2B5EF4-FFF2-40B4-BE49-F238E27FC236}">
+                <a16:creationId xmlns:a16="http://schemas.microsoft.com/office/drawing/2014/main" id="{EEE5B4A1-94AD-4E6B-AD4C-70287A1930DD}"/>
+              </a:ext>
+            </a:extLst>
+          </p:cNvPr>
+          <p:cNvSpPr txBox="1"/>
+          <p:nvPr/>
+        </p:nvSpPr>
+        <p:spPr>
+          <a:xfrm>
+            <a:off x="1647825" y="2330200"/>
+            <a:ext cx="5848351" cy="3231654"/>
+          </a:xfrm>
+          <a:prstGeom prst="rect">
+            <a:avLst/>
+          </a:prstGeom>
+          <a:noFill/>
+        </p:spPr>
+        <p:txBody>
+          <a:bodyPr wrap="square" rtlCol="0">
+            <a:spAutoFit/>
+          </a:bodyPr>
+          <a:lstStyle/>
+          <a:p>
+            <a:r>
+              <a:rPr lang="en-US" sz="1200" dirty="0"/>
+              <a:t>Task 1: Make sure the File corpus is located correctly</a:t>
+            </a:r>
+          </a:p>
+          <a:p>
+            <a:r>
+              <a:rPr lang="en-US" sz="1200" dirty="0"/>
+              <a:t>Task 2: Ensure Mallet is ready and executable</a:t>
+            </a:r>
+          </a:p>
+          <a:p>
+            <a:r>
+              <a:rPr lang="en-US" sz="1200" dirty="0"/>
+              <a:t>Task 3: Edit </a:t>
+            </a:r>
+            <a:r>
+              <a:rPr lang="en-US" sz="1200" dirty="0" err="1"/>
+              <a:t>FNb_MalletTopicModeling</a:t>
+            </a:r>
+            <a:r>
+              <a:rPr lang="en-US" sz="1200" dirty="0"/>
+              <a:t> .bat and ensure the variables are correctly set</a:t>
+            </a:r>
+          </a:p>
+          <a:p>
+            <a:r>
+              <a:rPr lang="en-US" sz="1200" dirty="0"/>
+              <a:t>Task 4: From windows, enter CMD in search bar on bottom left, open DOS window, go to relevant runtime directory</a:t>
+            </a:r>
+          </a:p>
+          <a:p>
+            <a:r>
+              <a:rPr lang="en-US" sz="1200" dirty="0"/>
+              <a:t>Task 5: Run the FNb_MalletTopicModeling.bat program</a:t>
+            </a:r>
+          </a:p>
+          <a:p>
+            <a:pPr marL="171450" indent="-171450">
+              <a:buFont typeface="Wingdings" panose="05000000000000000000" pitchFamily="2" charset="2"/>
+              <a:buChar char="Ø"/>
+            </a:pPr>
+            <a:r>
+              <a:rPr lang="en-US" sz="1200" dirty="0" err="1"/>
+              <a:t>FNb_MalletTopicModeling</a:t>
+            </a:r>
+            <a:endParaRPr lang="en-US" sz="1200" dirty="0"/>
+          </a:p>
+          <a:p>
+            <a:endParaRPr lang="en-US" sz="1200" dirty="0"/>
+          </a:p>
+          <a:p>
+            <a:r>
+              <a:rPr lang="en-US" sz="1200" dirty="0"/>
+              <a:t>Note: Once run, this produces:</a:t>
+            </a:r>
+          </a:p>
+          <a:p>
+            <a:pPr marL="228600" indent="-228600">
+              <a:buAutoNum type="arabicParenBoth"/>
+            </a:pPr>
+            <a:r>
+              <a:rPr lang="en-US" sz="1200" dirty="0"/>
+              <a:t>a “log” file that tracks all output results</a:t>
+            </a:r>
+          </a:p>
+          <a:p>
+            <a:pPr marL="228600" indent="-228600">
+              <a:buAutoNum type="arabicParenBoth"/>
+            </a:pPr>
+            <a:r>
+              <a:rPr lang="en-US" sz="1200" dirty="0"/>
+              <a:t>A set of files per topic set execution</a:t>
+            </a:r>
+          </a:p>
+          <a:p>
+            <a:pPr marL="171450" indent="-171450">
+              <a:buFontTx/>
+              <a:buChar char="-"/>
+            </a:pPr>
+            <a:r>
+              <a:rPr lang="en-US" sz="1200" dirty="0"/>
+              <a:t>A </a:t>
+            </a:r>
+            <a:r>
+              <a:rPr lang="en-US" sz="1200" dirty="0" err="1"/>
+              <a:t>workfile</a:t>
+            </a:r>
+            <a:endParaRPr lang="en-US" sz="1200" dirty="0"/>
+          </a:p>
+          <a:p>
+            <a:pPr marL="171450" indent="-171450">
+              <a:buFontTx/>
+              <a:buChar char="-"/>
+            </a:pPr>
+            <a:r>
+              <a:rPr lang="en-US" sz="1200" dirty="0"/>
+              <a:t>A zip file </a:t>
+            </a:r>
+          </a:p>
+          <a:p>
+            <a:pPr marL="171450" indent="-171450">
+              <a:buFontTx/>
+              <a:buChar char="-"/>
+            </a:pPr>
+            <a:r>
+              <a:rPr lang="en-US" sz="1200" dirty="0"/>
+              <a:t>A key file</a:t>
+            </a:r>
+          </a:p>
+          <a:p>
+            <a:pPr marL="171450" indent="-171450">
+              <a:buFontTx/>
+              <a:buChar char="-"/>
+            </a:pPr>
+            <a:r>
+              <a:rPr lang="en-US" sz="1200" dirty="0"/>
+              <a:t>A topic file</a:t>
+            </a:r>
+          </a:p>
+          <a:p>
+            <a:r>
+              <a:rPr lang="en-US" sz="1200" dirty="0"/>
+              <a:t>This means that if there are 10 topic sets executed, 40 out files will be produced – 4 per topic set</a:t>
+            </a:r>
+          </a:p>
+        </p:txBody>
+      </p:sp>
+    </p:spTree>
+    <p:extLst>
+      <p:ext uri="{BB962C8B-B14F-4D97-AF65-F5344CB8AC3E}">
+        <p14:creationId xmlns:p14="http://schemas.microsoft.com/office/powerpoint/2010/main" val="530733876"/>
       </p:ext>
     </p:extLst>
   </p:cSld>

</xml_diff>

<commit_message>
Step 3: Mallet Charting
Step3: Mallet Charting (see Step 3 instructions in Execution Instructions for more info)
(In addition to the above, 3 workfiles are created during execution)
</commit_message>
<xml_diff>
--- a/FakeNewsExecutionInstructions.pptx
+++ b/FakeNewsExecutionInstructions.pptx
@@ -7,6 +7,7 @@
   <p:sldIdLst>
     <p:sldId id="256" r:id="rId2"/>
     <p:sldId id="257" r:id="rId3"/>
+    <p:sldId id="258" r:id="rId4"/>
   </p:sldIdLst>
   <p:sldSz cx="9144000" cy="6858000" type="screen4x3"/>
   <p:notesSz cx="6858000" cy="9144000"/>
@@ -3847,6 +3848,638 @@
 </p:sld>
 </file>
 
+<file path=ppt/slides/slide3.xml><?xml version="1.0" encoding="utf-8"?>
+<p:sld xmlns:a="http://schemas.openxmlformats.org/drawingml/2006/main" xmlns:r="http://schemas.openxmlformats.org/officeDocument/2006/relationships" xmlns:p="http://schemas.openxmlformats.org/presentationml/2006/main">
+  <p:cSld>
+    <p:spTree>
+      <p:nvGrpSpPr>
+        <p:cNvPr id="1" name=""/>
+        <p:cNvGrpSpPr/>
+        <p:nvPr/>
+      </p:nvGrpSpPr>
+      <p:grpSpPr>
+        <a:xfrm>
+          <a:off x="0" y="0"/>
+          <a:ext cx="0" cy="0"/>
+          <a:chOff x="0" y="0"/>
+          <a:chExt cx="0" cy="0"/>
+        </a:xfrm>
+      </p:grpSpPr>
+      <p:sp>
+        <p:nvSpPr>
+          <p:cNvPr id="4" name="Flowchart: Stored Data 3">
+            <a:extLst>
+              <a:ext uri="{FF2B5EF4-FFF2-40B4-BE49-F238E27FC236}">
+                <a16:creationId xmlns:a16="http://schemas.microsoft.com/office/drawing/2014/main" id="{43B0CD6F-8087-429C-9DEA-967FEAE7D02E}"/>
+              </a:ext>
+            </a:extLst>
+          </p:cNvPr>
+          <p:cNvSpPr/>
+          <p:nvPr/>
+        </p:nvSpPr>
+        <p:spPr>
+          <a:xfrm>
+            <a:off x="1647825" y="1321386"/>
+            <a:ext cx="1581151" cy="866775"/>
+          </a:xfrm>
+          <a:prstGeom prst="flowChartOnlineStorage">
+            <a:avLst/>
+          </a:prstGeom>
+        </p:spPr>
+        <p:style>
+          <a:lnRef idx="1">
+            <a:schemeClr val="accent1"/>
+          </a:lnRef>
+          <a:fillRef idx="2">
+            <a:schemeClr val="accent1"/>
+          </a:fillRef>
+          <a:effectRef idx="1">
+            <a:schemeClr val="accent1"/>
+          </a:effectRef>
+          <a:fontRef idx="minor">
+            <a:schemeClr val="dk1"/>
+          </a:fontRef>
+        </p:style>
+        <p:txBody>
+          <a:bodyPr rot="0" spcFirstLastPara="0" vertOverflow="overflow" horzOverflow="overflow" vert="horz" wrap="square" lIns="0" tIns="45721" rIns="0" bIns="45721" numCol="1" spcCol="0" rtlCol="0" fromWordArt="0" anchor="ctr" anchorCtr="0" forceAA="0" compatLnSpc="1">
+            <a:prstTxWarp prst="textNoShape">
+              <a:avLst/>
+            </a:prstTxWarp>
+            <a:noAutofit/>
+          </a:bodyPr>
+          <a:lstStyle/>
+          <a:p>
+            <a:r>
+              <a:rPr lang="en-US" sz="1200" dirty="0" err="1"/>
+              <a:t>FNb</a:t>
+            </a:r>
+            <a:r>
+              <a:rPr lang="en-US" sz="1200" dirty="0"/>
+              <a:t> output</a:t>
+            </a:r>
+          </a:p>
+          <a:p>
+            <a:pPr marL="171450" indent="-171450">
+              <a:buFontTx/>
+              <a:buChar char="-"/>
+            </a:pPr>
+            <a:r>
+              <a:rPr lang="en-US" sz="1200" dirty="0"/>
+              <a:t>Log File</a:t>
+            </a:r>
+          </a:p>
+          <a:p>
+            <a:pPr marL="171450" indent="-171450">
+              <a:buFontTx/>
+              <a:buChar char="-"/>
+            </a:pPr>
+            <a:r>
+              <a:rPr lang="en-US" sz="1200" dirty="0"/>
+              <a:t>Keys</a:t>
+            </a:r>
+          </a:p>
+          <a:p>
+            <a:pPr marL="171450" indent="-171450">
+              <a:buFontTx/>
+              <a:buChar char="-"/>
+            </a:pPr>
+            <a:r>
+              <a:rPr lang="en-US" sz="1200" dirty="0"/>
+              <a:t>topics</a:t>
+            </a:r>
+          </a:p>
+        </p:txBody>
+      </p:sp>
+      <p:sp>
+        <p:nvSpPr>
+          <p:cNvPr id="5" name="Flowchart: Alternate Process 4">
+            <a:extLst>
+              <a:ext uri="{FF2B5EF4-FFF2-40B4-BE49-F238E27FC236}">
+                <a16:creationId xmlns:a16="http://schemas.microsoft.com/office/drawing/2014/main" id="{797E2542-1966-4B47-9544-D5DA577A1861}"/>
+              </a:ext>
+            </a:extLst>
+          </p:cNvPr>
+          <p:cNvSpPr/>
+          <p:nvPr/>
+        </p:nvSpPr>
+        <p:spPr>
+          <a:xfrm>
+            <a:off x="3829050" y="1321386"/>
+            <a:ext cx="1400175" cy="866775"/>
+          </a:xfrm>
+          <a:prstGeom prst="flowChartAlternateProcess">
+            <a:avLst/>
+          </a:prstGeom>
+        </p:spPr>
+        <p:style>
+          <a:lnRef idx="1">
+            <a:schemeClr val="accent2"/>
+          </a:lnRef>
+          <a:fillRef idx="2">
+            <a:schemeClr val="accent2"/>
+          </a:fillRef>
+          <a:effectRef idx="1">
+            <a:schemeClr val="accent2"/>
+          </a:effectRef>
+          <a:fontRef idx="minor">
+            <a:schemeClr val="dk1"/>
+          </a:fontRef>
+        </p:style>
+        <p:txBody>
+          <a:bodyPr rot="0" spcFirstLastPara="0" vertOverflow="overflow" horzOverflow="overflow" vert="horz" wrap="square" lIns="91440" tIns="45721" rIns="91440" bIns="45721" numCol="1" spcCol="0" rtlCol="0" fromWordArt="0" anchor="ctr" anchorCtr="0" forceAA="0" compatLnSpc="1">
+            <a:prstTxWarp prst="textNoShape">
+              <a:avLst/>
+            </a:prstTxWarp>
+            <a:noAutofit/>
+          </a:bodyPr>
+          <a:lstStyle/>
+          <a:p>
+            <a:pPr algn="ctr"/>
+            <a:r>
+              <a:rPr lang="en-US" sz="1200" dirty="0" err="1"/>
+              <a:t>FNc</a:t>
+            </a:r>
+            <a:endParaRPr lang="en-US" sz="1200" dirty="0"/>
+          </a:p>
+          <a:p>
+            <a:pPr algn="ctr"/>
+            <a:r>
+              <a:rPr lang="en-US" sz="1200" dirty="0"/>
+              <a:t>Mallet Charting</a:t>
+            </a:r>
+          </a:p>
+        </p:txBody>
+      </p:sp>
+      <p:sp>
+        <p:nvSpPr>
+          <p:cNvPr id="6" name="Flowchart: Stored Data 5">
+            <a:extLst>
+              <a:ext uri="{FF2B5EF4-FFF2-40B4-BE49-F238E27FC236}">
+                <a16:creationId xmlns:a16="http://schemas.microsoft.com/office/drawing/2014/main" id="{C668E419-CA4D-4445-8396-3F89E2CAE807}"/>
+              </a:ext>
+            </a:extLst>
+          </p:cNvPr>
+          <p:cNvSpPr/>
+          <p:nvPr/>
+        </p:nvSpPr>
+        <p:spPr>
+          <a:xfrm>
+            <a:off x="5829301" y="1321386"/>
+            <a:ext cx="1581151" cy="866775"/>
+          </a:xfrm>
+          <a:prstGeom prst="flowChartOnlineStorage">
+            <a:avLst/>
+          </a:prstGeom>
+        </p:spPr>
+        <p:style>
+          <a:lnRef idx="1">
+            <a:schemeClr val="accent1"/>
+          </a:lnRef>
+          <a:fillRef idx="2">
+            <a:schemeClr val="accent1"/>
+          </a:fillRef>
+          <a:effectRef idx="1">
+            <a:schemeClr val="accent1"/>
+          </a:effectRef>
+          <a:fontRef idx="minor">
+            <a:schemeClr val="dk1"/>
+          </a:fontRef>
+        </p:style>
+        <p:txBody>
+          <a:bodyPr rot="0" spcFirstLastPara="0" vertOverflow="overflow" horzOverflow="overflow" vert="horz" wrap="square" lIns="0" tIns="45721" rIns="0" bIns="45721" numCol="1" spcCol="0" rtlCol="0" fromWordArt="0" anchor="ctr" anchorCtr="0" forceAA="0" compatLnSpc="1">
+            <a:prstTxWarp prst="textNoShape">
+              <a:avLst/>
+            </a:prstTxWarp>
+            <a:noAutofit/>
+          </a:bodyPr>
+          <a:lstStyle/>
+          <a:p>
+            <a:r>
+              <a:rPr lang="en-US" sz="1200" dirty="0"/>
+              <a:t>Charts</a:t>
+            </a:r>
+          </a:p>
+        </p:txBody>
+      </p:sp>
+      <p:sp>
+        <p:nvSpPr>
+          <p:cNvPr id="7" name="TextBox 6">
+            <a:extLst>
+              <a:ext uri="{FF2B5EF4-FFF2-40B4-BE49-F238E27FC236}">
+                <a16:creationId xmlns:a16="http://schemas.microsoft.com/office/drawing/2014/main" id="{A0B04D06-8E34-46CE-82E4-D49C3EC0EB61}"/>
+              </a:ext>
+            </a:extLst>
+          </p:cNvPr>
+          <p:cNvSpPr txBox="1"/>
+          <p:nvPr/>
+        </p:nvSpPr>
+        <p:spPr>
+          <a:xfrm>
+            <a:off x="1647825" y="502233"/>
+            <a:ext cx="5848351" cy="492443"/>
+          </a:xfrm>
+          <a:prstGeom prst="rect">
+            <a:avLst/>
+          </a:prstGeom>
+          <a:noFill/>
+        </p:spPr>
+        <p:txBody>
+          <a:bodyPr wrap="square" rtlCol="0">
+            <a:spAutoFit/>
+          </a:bodyPr>
+          <a:lstStyle/>
+          <a:p>
+            <a:r>
+              <a:rPr lang="en-US" sz="1400" u="sng" dirty="0"/>
+              <a:t>Step 3: Mallet Charting</a:t>
+            </a:r>
+            <a:r>
+              <a:rPr lang="en-US" sz="1200" dirty="0"/>
+              <a:t>- Using the output from Mallet Topic Modeling in Step 2, produce various charts</a:t>
+            </a:r>
+          </a:p>
+        </p:txBody>
+      </p:sp>
+      <p:cxnSp>
+        <p:nvCxnSpPr>
+          <p:cNvPr id="9" name="Straight Arrow Connector 8">
+            <a:extLst>
+              <a:ext uri="{FF2B5EF4-FFF2-40B4-BE49-F238E27FC236}">
+                <a16:creationId xmlns:a16="http://schemas.microsoft.com/office/drawing/2014/main" id="{D697D031-988D-4DA4-9C29-7D41D967F1FE}"/>
+              </a:ext>
+            </a:extLst>
+          </p:cNvPr>
+          <p:cNvCxnSpPr>
+            <a:cxnSpLocks/>
+            <a:stCxn id="4" idx="3"/>
+            <a:endCxn id="5" idx="1"/>
+          </p:cNvCxnSpPr>
+          <p:nvPr/>
+        </p:nvCxnSpPr>
+        <p:spPr>
+          <a:xfrm>
+            <a:off x="2965450" y="1754770"/>
+            <a:ext cx="863600" cy="0"/>
+          </a:xfrm>
+          <a:prstGeom prst="straightConnector1">
+            <a:avLst/>
+          </a:prstGeom>
+          <a:ln>
+            <a:tailEnd type="triangle"/>
+          </a:ln>
+        </p:spPr>
+        <p:style>
+          <a:lnRef idx="2">
+            <a:schemeClr val="accent1"/>
+          </a:lnRef>
+          <a:fillRef idx="0">
+            <a:schemeClr val="accent1"/>
+          </a:fillRef>
+          <a:effectRef idx="1">
+            <a:schemeClr val="accent1"/>
+          </a:effectRef>
+          <a:fontRef idx="minor">
+            <a:schemeClr val="tx1"/>
+          </a:fontRef>
+        </p:style>
+      </p:cxnSp>
+      <p:cxnSp>
+        <p:nvCxnSpPr>
+          <p:cNvPr id="10" name="Straight Arrow Connector 9">
+            <a:extLst>
+              <a:ext uri="{FF2B5EF4-FFF2-40B4-BE49-F238E27FC236}">
+                <a16:creationId xmlns:a16="http://schemas.microsoft.com/office/drawing/2014/main" id="{ABC6B728-F278-47AC-ACCA-2E8720493BC4}"/>
+              </a:ext>
+            </a:extLst>
+          </p:cNvPr>
+          <p:cNvCxnSpPr>
+            <a:cxnSpLocks/>
+            <a:stCxn id="5" idx="3"/>
+            <a:endCxn id="6" idx="1"/>
+          </p:cNvCxnSpPr>
+          <p:nvPr/>
+        </p:nvCxnSpPr>
+        <p:spPr>
+          <a:xfrm>
+            <a:off x="5229228" y="1754770"/>
+            <a:ext cx="600075" cy="0"/>
+          </a:xfrm>
+          <a:prstGeom prst="straightConnector1">
+            <a:avLst/>
+          </a:prstGeom>
+          <a:ln>
+            <a:tailEnd type="triangle"/>
+          </a:ln>
+        </p:spPr>
+        <p:style>
+          <a:lnRef idx="2">
+            <a:schemeClr val="accent1"/>
+          </a:lnRef>
+          <a:fillRef idx="0">
+            <a:schemeClr val="accent1"/>
+          </a:fillRef>
+          <a:effectRef idx="1">
+            <a:schemeClr val="accent1"/>
+          </a:effectRef>
+          <a:fontRef idx="minor">
+            <a:schemeClr val="tx1"/>
+          </a:fontRef>
+        </p:style>
+      </p:cxnSp>
+      <p:sp>
+        <p:nvSpPr>
+          <p:cNvPr id="18" name="TextBox 17">
+            <a:extLst>
+              <a:ext uri="{FF2B5EF4-FFF2-40B4-BE49-F238E27FC236}">
+                <a16:creationId xmlns:a16="http://schemas.microsoft.com/office/drawing/2014/main" id="{EEE5B4A1-94AD-4E6B-AD4C-70287A1930DD}"/>
+              </a:ext>
+            </a:extLst>
+          </p:cNvPr>
+          <p:cNvSpPr txBox="1"/>
+          <p:nvPr/>
+        </p:nvSpPr>
+        <p:spPr>
+          <a:xfrm>
+            <a:off x="1647825" y="2330200"/>
+            <a:ext cx="5848351" cy="4524315"/>
+          </a:xfrm>
+          <a:prstGeom prst="rect">
+            <a:avLst/>
+          </a:prstGeom>
+          <a:noFill/>
+        </p:spPr>
+        <p:txBody>
+          <a:bodyPr wrap="square" rtlCol="0">
+            <a:spAutoFit/>
+          </a:bodyPr>
+          <a:lstStyle/>
+          <a:p>
+            <a:r>
+              <a:rPr lang="en-US" sz="1200" dirty="0"/>
+              <a:t>Task 1: Ensure Mallet Topic Modeling is run, and output is available (aka Step 2)</a:t>
+            </a:r>
+          </a:p>
+          <a:p>
+            <a:r>
+              <a:rPr lang="en-US" sz="1200" dirty="0"/>
+              <a:t>Task 2: Edit FNc_MalletCharting.py and ensure the file name and location variables are set</a:t>
+            </a:r>
+          </a:p>
+          <a:p>
+            <a:pPr marL="171450" indent="-171450">
+              <a:buFontTx/>
+              <a:buChar char="-"/>
+            </a:pPr>
+            <a:r>
+              <a:rPr lang="en-US" sz="1200" dirty="0"/>
+              <a:t>Log file from </a:t>
+            </a:r>
+            <a:r>
+              <a:rPr lang="en-US" sz="1200" dirty="0" err="1"/>
+              <a:t>FNb</a:t>
+            </a:r>
+            <a:r>
+              <a:rPr lang="en-US" sz="1200" dirty="0"/>
+              <a:t> output </a:t>
+            </a:r>
+            <a:r>
+              <a:rPr lang="en-US" sz="1200" dirty="0" err="1"/>
+              <a:t>eg</a:t>
+            </a:r>
+            <a:r>
+              <a:rPr lang="en-US" sz="1200" dirty="0"/>
+              <a:t> </a:t>
+            </a:r>
+          </a:p>
+          <a:p>
+            <a:pPr marL="171450" indent="-171450">
+              <a:buFontTx/>
+              <a:buChar char="-"/>
+            </a:pPr>
+            <a:r>
+              <a:rPr lang="en-US" sz="1200" dirty="0"/>
+              <a:t>Topic file from </a:t>
+            </a:r>
+            <a:r>
+              <a:rPr lang="en-US" sz="1200" dirty="0" err="1"/>
+              <a:t>FNb</a:t>
+            </a:r>
+            <a:r>
+              <a:rPr lang="en-US" sz="1200" dirty="0"/>
+              <a:t> output </a:t>
+            </a:r>
+            <a:r>
+              <a:rPr lang="en-US" sz="1200" dirty="0" err="1"/>
+              <a:t>eg</a:t>
+            </a:r>
+            <a:endParaRPr lang="en-US" sz="1200" dirty="0"/>
+          </a:p>
+          <a:p>
+            <a:pPr marL="171450" indent="-171450">
+              <a:buFontTx/>
+              <a:buChar char="-"/>
+            </a:pPr>
+            <a:r>
+              <a:rPr lang="en-US" sz="1200" dirty="0"/>
+              <a:t>Key file from </a:t>
+            </a:r>
+            <a:r>
+              <a:rPr lang="en-US" sz="1200" dirty="0" err="1"/>
+              <a:t>FNb</a:t>
+            </a:r>
+            <a:r>
+              <a:rPr lang="en-US" sz="1200" dirty="0"/>
+              <a:t> output </a:t>
+            </a:r>
+            <a:r>
+              <a:rPr lang="en-US" sz="1200" dirty="0" err="1"/>
+              <a:t>eg</a:t>
+            </a:r>
+            <a:endParaRPr lang="en-US" sz="1200" dirty="0"/>
+          </a:p>
+          <a:p>
+            <a:pPr marL="171450" indent="-171450">
+              <a:buFontTx/>
+              <a:buChar char="-"/>
+            </a:pPr>
+            <a:r>
+              <a:rPr lang="en-US" sz="1200" dirty="0"/>
+              <a:t>Corpus File Based directory name</a:t>
+            </a:r>
+          </a:p>
+          <a:p>
+            <a:pPr marL="171450" indent="-171450">
+              <a:buFontTx/>
+              <a:buChar char="-"/>
+            </a:pPr>
+            <a:r>
+              <a:rPr lang="en-US" sz="1200" dirty="0"/>
+              <a:t>(Important to note that you must choose one </a:t>
+            </a:r>
+            <a:r>
+              <a:rPr lang="en-US" sz="1200" dirty="0" err="1"/>
+              <a:t>keyfile</a:t>
+            </a:r>
+            <a:r>
+              <a:rPr lang="en-US" sz="1200" dirty="0"/>
+              <a:t> and one topic file from the permutations provided as output to Step 2)</a:t>
+            </a:r>
+          </a:p>
+          <a:p>
+            <a:r>
+              <a:rPr lang="en-US" sz="1200" dirty="0"/>
+              <a:t>Task 3: Run the FNb_MalletCharting.py program in Spyder</a:t>
+            </a:r>
+          </a:p>
+          <a:p>
+            <a:endParaRPr lang="en-US" sz="1200" dirty="0"/>
+          </a:p>
+          <a:p>
+            <a:r>
+              <a:rPr lang="en-US" sz="1200" dirty="0"/>
+              <a:t>Note: Once run, this produces:</a:t>
+            </a:r>
+          </a:p>
+          <a:p>
+            <a:pPr marL="228600" indent="-228600">
+              <a:buAutoNum type="arabicParenBoth"/>
+            </a:pPr>
+            <a:r>
+              <a:rPr lang="en-US" sz="1200" dirty="0"/>
+              <a:t>a “log” file that tracks all output results</a:t>
+            </a:r>
+          </a:p>
+          <a:p>
+            <a:pPr marL="228600" indent="-228600">
+              <a:buAutoNum type="arabicParenBoth"/>
+            </a:pPr>
+            <a:r>
+              <a:rPr lang="en-US" sz="1200" dirty="0"/>
+              <a:t>A set of charts</a:t>
+            </a:r>
+          </a:p>
+          <a:p>
+            <a:pPr marL="171450" indent="-171450">
+              <a:buFontTx/>
+              <a:buChar char="-"/>
+            </a:pPr>
+            <a:r>
+              <a:rPr lang="en-US" sz="1200" dirty="0" err="1"/>
+              <a:t>Ll</a:t>
+            </a:r>
+            <a:r>
+              <a:rPr lang="en-US" sz="1200" dirty="0"/>
+              <a:t>/token reported values </a:t>
+            </a:r>
+            <a:r>
+              <a:rPr lang="en-US" sz="1200" dirty="0" err="1"/>
+              <a:t>linechart</a:t>
+            </a:r>
+            <a:r>
+              <a:rPr lang="en-US" sz="1200" dirty="0"/>
+              <a:t> per </a:t>
+            </a:r>
+            <a:r>
+              <a:rPr lang="en-US" sz="1200" dirty="0" err="1"/>
+              <a:t>NumTopic</a:t>
+            </a:r>
+            <a:endParaRPr lang="en-US" sz="1200" dirty="0"/>
+          </a:p>
+          <a:p>
+            <a:pPr marL="171450" indent="-171450">
+              <a:buFontTx/>
+              <a:buChar char="-"/>
+            </a:pPr>
+            <a:r>
+              <a:rPr lang="en-US" sz="1200" dirty="0"/>
+              <a:t>Distribution of Observations by Label</a:t>
+            </a:r>
+          </a:p>
+          <a:p>
+            <a:pPr marL="171450" indent="-171450">
+              <a:buFontTx/>
+              <a:buChar char="-"/>
+            </a:pPr>
+            <a:r>
+              <a:rPr lang="en-US" sz="1200" dirty="0"/>
+              <a:t>Distribution of Best Topic Selected by Document</a:t>
+            </a:r>
+          </a:p>
+          <a:p>
+            <a:pPr marL="628650" lvl="1" indent="-171450">
+              <a:buFontTx/>
+              <a:buChar char="-"/>
+            </a:pPr>
+            <a:r>
+              <a:rPr lang="en-US" sz="1200" dirty="0"/>
+              <a:t>Note that each document fits into all topics, and a number is provided describing “how well” the document fits the topic. The Best Topic per Document is the one with the max value for topic fit.</a:t>
+            </a:r>
+          </a:p>
+          <a:p>
+            <a:pPr marL="171450" indent="-171450">
+              <a:buFontTx/>
+              <a:buChar char="-"/>
+            </a:pPr>
+            <a:r>
+              <a:rPr lang="en-US" sz="1200" dirty="0"/>
+              <a:t>Distribution of Best Topic by Document, stacked by label</a:t>
+            </a:r>
+          </a:p>
+          <a:p>
+            <a:pPr marL="628650" lvl="1" indent="-171450">
+              <a:buFontTx/>
+              <a:buChar char="-"/>
+            </a:pPr>
+            <a:r>
+              <a:rPr lang="en-US" sz="1200" dirty="0"/>
+              <a:t>Same as previous (best topic selected by document), but stacked by label</a:t>
+            </a:r>
+          </a:p>
+          <a:p>
+            <a:pPr marL="171450" indent="-171450">
+              <a:buFontTx/>
+              <a:buChar char="-"/>
+            </a:pPr>
+            <a:r>
+              <a:rPr lang="en-US" sz="1200" dirty="0" err="1"/>
+              <a:t>Wordcloud</a:t>
+            </a:r>
+            <a:r>
+              <a:rPr lang="en-US" sz="1200" dirty="0"/>
+              <a:t> for top n words (from vectorizer)</a:t>
+            </a:r>
+          </a:p>
+          <a:p>
+            <a:pPr marL="171450" indent="-171450">
+              <a:buFontTx/>
+              <a:buChar char="-"/>
+            </a:pPr>
+            <a:r>
+              <a:rPr lang="en-US" sz="1200" dirty="0"/>
+              <a:t>Most Important Words Chart</a:t>
+            </a:r>
+          </a:p>
+          <a:p>
+            <a:r>
+              <a:rPr lang="en-US" sz="1200" dirty="0"/>
+              <a:t>(3) KPI output results</a:t>
+            </a:r>
+          </a:p>
+        </p:txBody>
+      </p:sp>
+    </p:spTree>
+    <p:extLst>
+      <p:ext uri="{BB962C8B-B14F-4D97-AF65-F5344CB8AC3E}">
+        <p14:creationId xmlns:p14="http://schemas.microsoft.com/office/powerpoint/2010/main" val="869782724"/>
+      </p:ext>
+    </p:extLst>
+  </p:cSld>
+  <p:clrMapOvr>
+    <a:masterClrMapping/>
+  </p:clrMapOvr>
+</p:sld>
+</file>
+
 <file path=ppt/theme/theme1.xml><?xml version="1.0" encoding="utf-8"?>
 <a:theme xmlns:a="http://schemas.openxmlformats.org/drawingml/2006/main" name="Office Theme">
   <a:themeElements>

</xml_diff>